<commit_message>
Fix year to 2022
</commit_message>
<xml_diff>
--- a/assets/Collegeville22WorkshopImages.pptx
+++ b/assets/Collegeville22WorkshopImages.pptx
@@ -17934,7 +17934,7 @@
           <a:p>
             <a:fld id="{02AC24A9-CCB6-4F8D-B8DB-C2F3692CFA5A}" type="datetimeFigureOut">
               <a:rPr lang="en-US" smtClean="0"/>
-              <a:t>3/1/22</a:t>
+              <a:t>4/6/22</a:t>
             </a:fld>
             <a:endParaRPr lang="en-US" dirty="0"/>
           </a:p>
@@ -18304,7 +18304,7 @@
           <a:p>
             <a:fld id="{02AC24A9-CCB6-4F8D-B8DB-C2F3692CFA5A}" type="datetimeFigureOut">
               <a:rPr lang="en-US" smtClean="0"/>
-              <a:t>3/1/22</a:t>
+              <a:t>4/6/22</a:t>
             </a:fld>
             <a:endParaRPr lang="en-US"/>
           </a:p>
@@ -18513,7 +18513,7 @@
           <a:p>
             <a:fld id="{02AC24A9-CCB6-4F8D-B8DB-C2F3692CFA5A}" type="datetimeFigureOut">
               <a:rPr lang="en-US" smtClean="0"/>
-              <a:t>3/1/22</a:t>
+              <a:t>4/6/22</a:t>
             </a:fld>
             <a:endParaRPr lang="en-US"/>
           </a:p>
@@ -18983,7 +18983,7 @@
           <a:p>
             <a:fld id="{02AC24A9-CCB6-4F8D-B8DB-C2F3692CFA5A}" type="datetimeFigureOut">
               <a:rPr lang="en-US" smtClean="0"/>
-              <a:t>3/1/22</a:t>
+              <a:t>4/6/22</a:t>
             </a:fld>
             <a:endParaRPr lang="en-US"/>
           </a:p>
@@ -19437,7 +19437,7 @@
           <a:p>
             <a:fld id="{02AC24A9-CCB6-4F8D-B8DB-C2F3692CFA5A}" type="datetimeFigureOut">
               <a:rPr lang="en-US" smtClean="0"/>
-              <a:t>3/1/22</a:t>
+              <a:t>4/6/22</a:t>
             </a:fld>
             <a:endParaRPr lang="en-US"/>
           </a:p>
@@ -19969,7 +19969,7 @@
           <a:p>
             <a:fld id="{02AC24A9-CCB6-4F8D-B8DB-C2F3692CFA5A}" type="datetimeFigureOut">
               <a:rPr lang="en-US" smtClean="0"/>
-              <a:t>3/1/22</a:t>
+              <a:t>4/6/22</a:t>
             </a:fld>
             <a:endParaRPr lang="en-US"/>
           </a:p>
@@ -20668,7 +20668,7 @@
           <a:p>
             <a:fld id="{02AC24A9-CCB6-4F8D-B8DB-C2F3692CFA5A}" type="datetimeFigureOut">
               <a:rPr lang="en-US" smtClean="0"/>
-              <a:t>3/1/22</a:t>
+              <a:t>4/6/22</a:t>
             </a:fld>
             <a:endParaRPr lang="en-US"/>
           </a:p>
@@ -20997,7 +20997,7 @@
           <a:p>
             <a:fld id="{02AC24A9-CCB6-4F8D-B8DB-C2F3692CFA5A}" type="datetimeFigureOut">
               <a:rPr lang="en-US" smtClean="0"/>
-              <a:t>3/1/22</a:t>
+              <a:t>4/6/22</a:t>
             </a:fld>
             <a:endParaRPr lang="en-US"/>
           </a:p>
@@ -21110,7 +21110,7 @@
           <a:p>
             <a:fld id="{02AC24A9-CCB6-4F8D-B8DB-C2F3692CFA5A}" type="datetimeFigureOut">
               <a:rPr lang="en-US" smtClean="0"/>
-              <a:t>3/1/22</a:t>
+              <a:t>4/6/22</a:t>
             </a:fld>
             <a:endParaRPr lang="en-US"/>
           </a:p>
@@ -21605,7 +21605,7 @@
           <a:p>
             <a:fld id="{02AC24A9-CCB6-4F8D-B8DB-C2F3692CFA5A}" type="datetimeFigureOut">
               <a:rPr lang="en-US" smtClean="0"/>
-              <a:t>3/1/22</a:t>
+              <a:t>4/6/22</a:t>
             </a:fld>
             <a:endParaRPr lang="en-US" dirty="0"/>
           </a:p>
@@ -22082,7 +22082,7 @@
           <a:p>
             <a:fld id="{02AC24A9-CCB6-4F8D-B8DB-C2F3692CFA5A}" type="datetimeFigureOut">
               <a:rPr lang="en-US" smtClean="0"/>
-              <a:t>3/1/22</a:t>
+              <a:t>4/6/22</a:t>
             </a:fld>
             <a:endParaRPr lang="en-US"/>
           </a:p>
@@ -22325,7 +22325,7 @@
           <a:p>
             <a:fld id="{02AC24A9-CCB6-4F8D-B8DB-C2F3692CFA5A}" type="datetimeFigureOut">
               <a:rPr lang="en-US" smtClean="0"/>
-              <a:t>3/1/22</a:t>
+              <a:t>4/6/22</a:t>
             </a:fld>
             <a:endParaRPr lang="en-US"/>
           </a:p>
@@ -23183,7 +23183,7 @@
                   <a:schemeClr val="bg1"/>
                 </a:solidFill>
               </a:rPr>
-              <a:t>July 25 – 29, 2021</a:t>
+              <a:t>July 25 – 29, 2022</a:t>
             </a:r>
             <a:br>
               <a:rPr lang="en-US" sz="3200" dirty="0">

</xml_diff>